<commit_message>
Render website with existing slides
</commit_message>
<xml_diff>
--- a/_site/materials/OS-M3/OS-M3-S5-GitHub/OS-M3-S5-GitHub-slides.pptx
+++ b/_site/materials/OS-M3/OS-M3-S5-GitHub/OS-M3-S5-GitHub-slides.pptx
@@ -3955,7 +3955,7 @@
             </a:pPr>
             <a:r>
               <a:rPr/>
-              <a:t>Template Slides: Title of Submodule</a:t>
+              <a:t>Introduction to Collaborative Coding with GitHub</a:t>
             </a:r>
           </a:p>
         </p:txBody>
@@ -3987,7 +3987,7 @@
             <a:br/>
             <a:r>
               <a:rPr/>
-              <a:t>Author</a:t>
+              <a:t>Elizabeth Waterfield</a:t>
             </a:r>
           </a:p>
         </p:txBody>

</xml_diff>